<commit_message>
Updated the file name
</commit_message>
<xml_diff>
--- a/LendingClubCaseStudy.pptx
+++ b/LendingClubCaseStudy.pptx
@@ -34,16 +34,16 @@
   <p:notesSz cx="6858000" cy="9144000"/>
   <p:embeddedFontLst>
     <p:embeddedFont>
-      <p:font typeface="Calibri" panose="020F0502020204030204" pitchFamily="34" charset="0"/>
+      <p:font typeface="Inter-Regular" panose="020B0604020202020204" charset="0"/>
       <p:regular r:id="rId24"/>
       <p:bold r:id="rId25"/>
-      <p:italic r:id="rId26"/>
-      <p:boldItalic r:id="rId27"/>
     </p:embeddedFont>
     <p:embeddedFont>
-      <p:font typeface="Inter-Regular" panose="020B0604020202020204" charset="0"/>
-      <p:regular r:id="rId28"/>
-      <p:bold r:id="rId29"/>
+      <p:font typeface="Calibri" panose="020F0502020204030204" pitchFamily="34" charset="0"/>
+      <p:regular r:id="rId26"/>
+      <p:bold r:id="rId27"/>
+      <p:italic r:id="rId28"/>
+      <p:boldItalic r:id="rId29"/>
     </p:embeddedFont>
   </p:embeddedFontLst>
   <p:defaultTextStyle>
@@ -47519,16 +47519,7 @@
                 </a:solidFill>
                 <a:latin typeface="Inter"/>
               </a:rPr>
-              <a:t>/</a:t>
-            </a:r>
-            <a:r>
-              <a:rPr lang="en-US" sz="1200" b="1" dirty="0" err="1" smtClean="0">
-                <a:solidFill>
-                  <a:srgbClr val="151515"/>
-                </a:solidFill>
-                <a:latin typeface="Inter"/>
-              </a:rPr>
-              <a:t>loan_amnt</a:t>
+              <a:t>”, </a:t>
             </a:r>
             <a:r>
               <a:rPr lang="en-US" sz="1200" b="1" dirty="0" smtClean="0">
@@ -47537,7 +47528,7 @@
                 </a:solidFill>
                 <a:latin typeface="Inter"/>
               </a:rPr>
-              <a:t>”, “</a:t>
+              <a:t>“</a:t>
             </a:r>
             <a:r>
               <a:rPr lang="en-US" sz="1200" b="1" dirty="0" err="1" smtClean="0">
@@ -47651,7 +47642,7 @@
                 </a:solidFill>
                 <a:latin typeface="Inter"/>
               </a:rPr>
-              <a:t>loan_amnt</a:t>
+              <a:t>Funded_amt</a:t>
             </a:r>
             <a:r>
               <a:rPr lang="en-US" sz="1200" b="1" dirty="0" smtClean="0">
@@ -48352,11 +48343,7 @@
             </a:r>
             <a:r>
               <a:rPr lang="en-US" sz="1600" dirty="0" smtClean="0"/>
-              <a:t>hort </a:t>
-            </a:r>
-            <a:r>
-              <a:rPr lang="en-US" sz="1600" dirty="0" smtClean="0"/>
-              <a:t>terms.</a:t>
+              <a:t>hort terms.</a:t>
             </a:r>
           </a:p>
           <a:p>
@@ -48369,15 +48356,7 @@
             </a:pPr>
             <a:r>
               <a:rPr lang="en-US" sz="1600" dirty="0" smtClean="0"/>
-              <a:t>Average </a:t>
-            </a:r>
-            <a:r>
-              <a:rPr lang="en-US" sz="1600" dirty="0" smtClean="0"/>
-              <a:t>interest rate </a:t>
-            </a:r>
-            <a:r>
-              <a:rPr lang="en-US" sz="1600" dirty="0" smtClean="0"/>
-              <a:t>of the loans are likely to Fully Paid, so if the banks gives loans at moderate level of interest it can avoid loss.</a:t>
+              <a:t>Average interest rate of the loans are likely to Fully Paid, so if the banks gives loans at moderate level of interest it can avoid loss.</a:t>
             </a:r>
           </a:p>
           <a:p>
@@ -48427,7 +48406,6 @@
               <a:rPr lang="en-US" sz="1600" dirty="0" smtClean="0"/>
               <a:t> </a:t>
             </a:r>
-            <a:endParaRPr lang="en-US" sz="1600" dirty="0" smtClean="0"/>
           </a:p>
           <a:p>
             <a:pPr marL="285750" indent="-285750">
@@ -48436,15 +48414,7 @@
             </a:pPr>
             <a:r>
               <a:rPr lang="en-US" sz="1600" dirty="0" smtClean="0"/>
-              <a:t>The Bank can avoid the charged-offs with quality verification process for loan approvals when loan amount is </a:t>
-            </a:r>
-            <a:r>
-              <a:rPr lang="en-US" sz="1600" dirty="0" smtClean="0"/>
-              <a:t>higher for the Grade E, F</a:t>
-            </a:r>
-            <a:r>
-              <a:rPr lang="en-US" sz="1600" smtClean="0"/>
-              <a:t>, G.</a:t>
+              <a:t>The Bank can avoid the charged-offs with quality verification process for loan approvals when loan amount is higher for the Grade E, F, G.</a:t>
             </a:r>
             <a:endParaRPr lang="en-GB" sz="1600" dirty="0"/>
           </a:p>

</xml_diff>